<commit_message>
fix double jump exception
</commit_message>
<xml_diff>
--- a/nistfanuc_ws/doc/ROSSlides.pptx
+++ b/nistfanuc_ws/doc/ROSSlides.pptx
@@ -11,11 +11,14 @@
     <p:sldId id="259" r:id="rId5"/>
     <p:sldId id="264" r:id="rId6"/>
     <p:sldId id="260" r:id="rId7"/>
-    <p:sldId id="262" r:id="rId8"/>
-    <p:sldId id="261" r:id="rId9"/>
+    <p:sldId id="265" r:id="rId8"/>
+    <p:sldId id="262" r:id="rId9"/>
+    <p:sldId id="266" r:id="rId10"/>
+    <p:sldId id="267" r:id="rId11"/>
+    <p:sldId id="261" r:id="rId12"/>
   </p:sldIdLst>
   <p:sldSz cx="12192000" cy="6858000"/>
-  <p:notesSz cx="6858000" cy="9144000"/>
+  <p:notesSz cx="7023100" cy="9309100"/>
   <p:defaultTextStyle>
     <a:defPPr>
       <a:defRPr lang="en-US"/>
@@ -3025,6 +3028,178 @@
 </p:sld>
 </file>
 
+<file path=ppt/slides/slide10.xml><?xml version="1.0" encoding="utf-8"?>
+<p:sld xmlns:a="http://schemas.openxmlformats.org/drawingml/2006/main" xmlns:r="http://schemas.openxmlformats.org/officeDocument/2006/relationships" xmlns:p="http://schemas.openxmlformats.org/presentationml/2006/main">
+  <p:cSld>
+    <p:spTree>
+      <p:nvGrpSpPr>
+        <p:cNvPr id="1" name=""/>
+        <p:cNvGrpSpPr/>
+        <p:nvPr/>
+      </p:nvGrpSpPr>
+      <p:grpSpPr>
+        <a:xfrm>
+          <a:off x="0" y="0"/>
+          <a:ext cx="0" cy="0"/>
+          <a:chOff x="0" y="0"/>
+          <a:chExt cx="0" cy="0"/>
+        </a:xfrm>
+      </p:grpSpPr>
+      <p:sp>
+        <p:nvSpPr>
+          <p:cNvPr id="2" name="Title 1"/>
+          <p:cNvSpPr>
+            <a:spLocks noGrp="1"/>
+          </p:cNvSpPr>
+          <p:nvPr>
+            <p:ph type="title"/>
+          </p:nvPr>
+        </p:nvSpPr>
+        <p:spPr/>
+        <p:txBody>
+          <a:bodyPr/>
+          <a:lstStyle/>
+          <a:p>
+            <a:r>
+              <a:rPr lang="en-US" dirty="0"/>
+              <a:t>Pose Data Type </a:t>
+            </a:r>
+            <a:r>
+              <a:rPr lang="en-US" dirty="0" err="1"/>
+              <a:t>Sphagetti</a:t>
+            </a:r>
+            <a:endParaRPr lang="en-US" dirty="0"/>
+          </a:p>
+        </p:txBody>
+      </p:sp>
+      <p:pic>
+        <p:nvPicPr>
+          <p:cNvPr id="3" name="Picture 2"/>
+          <p:cNvPicPr>
+            <a:picLocks noChangeAspect="1"/>
+          </p:cNvPicPr>
+          <p:nvPr/>
+        </p:nvPicPr>
+        <p:blipFill>
+          <a:blip r:embed="rId2"/>
+          <a:stretch>
+            <a:fillRect/>
+          </a:stretch>
+        </p:blipFill>
+        <p:spPr>
+          <a:xfrm>
+            <a:off x="2269876" y="1986085"/>
+            <a:ext cx="7307877" cy="4530614"/>
+          </a:xfrm>
+          <a:prstGeom prst="rect">
+            <a:avLst/>
+          </a:prstGeom>
+        </p:spPr>
+      </p:pic>
+    </p:spTree>
+    <p:extLst>
+      <p:ext uri="{BB962C8B-B14F-4D97-AF65-F5344CB8AC3E}">
+        <p14:creationId xmlns:p14="http://schemas.microsoft.com/office/powerpoint/2010/main" val="521032797"/>
+      </p:ext>
+    </p:extLst>
+  </p:cSld>
+  <p:clrMapOvr>
+    <a:masterClrMapping/>
+  </p:clrMapOvr>
+</p:sld>
+</file>
+
+<file path=ppt/slides/slide11.xml><?xml version="1.0" encoding="utf-8"?>
+<p:sld xmlns:a="http://schemas.openxmlformats.org/drawingml/2006/main" xmlns:r="http://schemas.openxmlformats.org/officeDocument/2006/relationships" xmlns:p="http://schemas.openxmlformats.org/presentationml/2006/main">
+  <p:cSld>
+    <p:spTree>
+      <p:nvGrpSpPr>
+        <p:cNvPr id="1" name=""/>
+        <p:cNvGrpSpPr/>
+        <p:nvPr/>
+      </p:nvGrpSpPr>
+      <p:grpSpPr>
+        <a:xfrm>
+          <a:off x="0" y="0"/>
+          <a:ext cx="0" cy="0"/>
+          <a:chOff x="0" y="0"/>
+          <a:chExt cx="0" cy="0"/>
+        </a:xfrm>
+      </p:grpSpPr>
+      <p:pic>
+        <p:nvPicPr>
+          <p:cNvPr id="4" name="Picture 3"/>
+          <p:cNvPicPr>
+            <a:picLocks noChangeAspect="1"/>
+          </p:cNvPicPr>
+          <p:nvPr/>
+        </p:nvPicPr>
+        <p:blipFill>
+          <a:blip r:embed="rId2">
+            <a:extLst>
+              <a:ext uri="{28A0092B-C50C-407E-A947-70E740481C1C}">
+                <a14:useLocalDpi xmlns:a14="http://schemas.microsoft.com/office/drawing/2010/main" val="0"/>
+              </a:ext>
+            </a:extLst>
+          </a:blip>
+          <a:stretch>
+            <a:fillRect/>
+          </a:stretch>
+        </p:blipFill>
+        <p:spPr>
+          <a:xfrm>
+            <a:off x="1466224" y="1393848"/>
+            <a:ext cx="9198907" cy="5535869"/>
+          </a:xfrm>
+          <a:prstGeom prst="rect">
+            <a:avLst/>
+          </a:prstGeom>
+        </p:spPr>
+      </p:pic>
+      <p:sp>
+        <p:nvSpPr>
+          <p:cNvPr id="5" name="Title 4"/>
+          <p:cNvSpPr>
+            <a:spLocks noGrp="1"/>
+          </p:cNvSpPr>
+          <p:nvPr>
+            <p:ph type="title"/>
+          </p:nvPr>
+        </p:nvSpPr>
+        <p:spPr>
+          <a:xfrm>
+            <a:off x="591671" y="365125"/>
+            <a:ext cx="10762129" cy="1325563"/>
+          </a:xfrm>
+        </p:spPr>
+        <p:txBody>
+          <a:bodyPr/>
+          <a:lstStyle/>
+          <a:p>
+            <a:r>
+              <a:rPr lang="en-US" dirty="0" err="1"/>
+              <a:t>Rviz</a:t>
+            </a:r>
+            <a:r>
+              <a:rPr lang="en-US" dirty="0"/>
+              <a:t> Bang-bang Simulation of Bolt placement</a:t>
+            </a:r>
+          </a:p>
+        </p:txBody>
+      </p:sp>
+    </p:spTree>
+    <p:extLst>
+      <p:ext uri="{BB962C8B-B14F-4D97-AF65-F5344CB8AC3E}">
+        <p14:creationId xmlns:p14="http://schemas.microsoft.com/office/powerpoint/2010/main" val="1610002266"/>
+      </p:ext>
+    </p:extLst>
+  </p:cSld>
+  <p:clrMapOvr>
+    <a:masterClrMapping/>
+  </p:clrMapOvr>
+</p:sld>
+</file>
+
 <file path=ppt/slides/slide2.xml><?xml version="1.0" encoding="utf-8"?>
 <p:sld xmlns:a="http://schemas.openxmlformats.org/drawingml/2006/main" xmlns:r="http://schemas.openxmlformats.org/officeDocument/2006/relationships" xmlns:p="http://schemas.openxmlformats.org/presentationml/2006/main">
   <p:cSld>
@@ -8972,6 +9147,100 @@
 </file>
 
 <file path=ppt/slides/slide7.xml><?xml version="1.0" encoding="utf-8"?>
+<p:sld xmlns:a="http://schemas.openxmlformats.org/drawingml/2006/main" xmlns:r="http://schemas.openxmlformats.org/officeDocument/2006/relationships" xmlns:p="http://schemas.openxmlformats.org/presentationml/2006/main">
+  <p:cSld>
+    <p:spTree>
+      <p:nvGrpSpPr>
+        <p:cNvPr id="1" name=""/>
+        <p:cNvGrpSpPr/>
+        <p:nvPr/>
+      </p:nvGrpSpPr>
+      <p:grpSpPr>
+        <a:xfrm>
+          <a:off x="0" y="0"/>
+          <a:ext cx="0" cy="0"/>
+          <a:chOff x="0" y="0"/>
+          <a:chExt cx="0" cy="0"/>
+        </a:xfrm>
+      </p:grpSpPr>
+      <p:sp>
+        <p:nvSpPr>
+          <p:cNvPr id="4" name="Title 3"/>
+          <p:cNvSpPr>
+            <a:spLocks noGrp="1"/>
+          </p:cNvSpPr>
+          <p:nvPr>
+            <p:ph type="title"/>
+          </p:nvPr>
+        </p:nvSpPr>
+        <p:spPr/>
+        <p:txBody>
+          <a:bodyPr/>
+          <a:lstStyle/>
+          <a:p>
+            <a:pPr algn="ctr"/>
+            <a:r>
+              <a:rPr lang="en-US" dirty="0"/>
+              <a:t>ROS as Spaghetti</a:t>
+            </a:r>
+          </a:p>
+        </p:txBody>
+      </p:sp>
+      <p:pic>
+        <p:nvPicPr>
+          <p:cNvPr id="1026" name="Picture 2" descr="http://www.proun-game.com/Oogst3D/BLOG/Italian%20Food%20Coding%20Spaghetti.jpg"/>
+          <p:cNvPicPr>
+            <a:picLocks noChangeAspect="1" noChangeArrowheads="1"/>
+          </p:cNvPicPr>
+          <p:nvPr/>
+        </p:nvPicPr>
+        <p:blipFill>
+          <a:blip r:embed="rId2">
+            <a:extLst>
+              <a:ext uri="{28A0092B-C50C-407E-A947-70E740481C1C}">
+                <a14:useLocalDpi xmlns:a14="http://schemas.microsoft.com/office/drawing/2010/main" val="0"/>
+              </a:ext>
+            </a:extLst>
+          </a:blip>
+          <a:srcRect/>
+          <a:stretch>
+            <a:fillRect/>
+          </a:stretch>
+        </p:blipFill>
+        <p:spPr bwMode="auto">
+          <a:xfrm>
+            <a:off x="2801816" y="1690688"/>
+            <a:ext cx="6846277" cy="5257940"/>
+          </a:xfrm>
+          <a:prstGeom prst="rect">
+            <a:avLst/>
+          </a:prstGeom>
+          <a:noFill/>
+          <a:extLst>
+            <a:ext uri="{909E8E84-426E-40DD-AFC4-6F175D3DCCD1}">
+              <a14:hiddenFill xmlns:a14="http://schemas.microsoft.com/office/drawing/2010/main">
+                <a:solidFill>
+                  <a:srgbClr val="FFFFFF"/>
+                </a:solidFill>
+              </a14:hiddenFill>
+            </a:ext>
+          </a:extLst>
+        </p:spPr>
+      </p:pic>
+    </p:spTree>
+    <p:extLst>
+      <p:ext uri="{BB962C8B-B14F-4D97-AF65-F5344CB8AC3E}">
+        <p14:creationId xmlns:p14="http://schemas.microsoft.com/office/powerpoint/2010/main" val="2348393308"/>
+      </p:ext>
+    </p:extLst>
+  </p:cSld>
+  <p:clrMapOvr>
+    <a:masterClrMapping/>
+  </p:clrMapOvr>
+</p:sld>
+</file>
+
+<file path=ppt/slides/slide8.xml><?xml version="1.0" encoding="utf-8"?>
 <p:sld xmlns:a="http://schemas.openxmlformats.org/drawingml/2006/main" xmlns:r="http://schemas.openxmlformats.org/officeDocument/2006/relationships" xmlns:p="http://schemas.openxmlformats.org/presentationml/2006/main">
   <p:cSld>
     <p:spTree>
@@ -9429,7 +9698,7 @@
 </p:sld>
 </file>
 
-<file path=ppt/slides/slide8.xml><?xml version="1.0" encoding="utf-8"?>
+<file path=ppt/slides/slide9.xml><?xml version="1.0" encoding="utf-8"?>
 <p:sld xmlns:a="http://schemas.openxmlformats.org/drawingml/2006/main" xmlns:r="http://schemas.openxmlformats.org/officeDocument/2006/relationships" xmlns:p="http://schemas.openxmlformats.org/presentationml/2006/main">
   <p:cSld>
     <p:spTree>
@@ -9446,39 +9715,9 @@
           <a:chExt cx="0" cy="0"/>
         </a:xfrm>
       </p:grpSpPr>
-      <p:pic>
-        <p:nvPicPr>
-          <p:cNvPr id="4" name="Picture 3"/>
-          <p:cNvPicPr>
-            <a:picLocks noChangeAspect="1"/>
-          </p:cNvPicPr>
-          <p:nvPr/>
-        </p:nvPicPr>
-        <p:blipFill>
-          <a:blip r:embed="rId2">
-            <a:extLst>
-              <a:ext uri="{28A0092B-C50C-407E-A947-70E740481C1C}">
-                <a14:useLocalDpi xmlns:a14="http://schemas.microsoft.com/office/drawing/2010/main" val="0"/>
-              </a:ext>
-            </a:extLst>
-          </a:blip>
-          <a:stretch>
-            <a:fillRect/>
-          </a:stretch>
-        </p:blipFill>
-        <p:spPr>
-          <a:xfrm>
-            <a:off x="1466224" y="1393848"/>
-            <a:ext cx="9198907" cy="5535869"/>
-          </a:xfrm>
-          <a:prstGeom prst="rect">
-            <a:avLst/>
-          </a:prstGeom>
-        </p:spPr>
-      </p:pic>
       <p:sp>
         <p:nvSpPr>
-          <p:cNvPr id="5" name="Title 4"/>
+          <p:cNvPr id="2" name="Title 1"/>
           <p:cNvSpPr>
             <a:spLocks noGrp="1"/>
           </p:cNvSpPr>
@@ -9486,31 +9725,46 @@
             <p:ph type="title"/>
           </p:nvPr>
         </p:nvSpPr>
-        <p:spPr>
-          <a:xfrm>
-            <a:off x="591671" y="365125"/>
-            <a:ext cx="10762129" cy="1325563"/>
-          </a:xfrm>
-        </p:spPr>
+        <p:spPr/>
         <p:txBody>
           <a:bodyPr/>
           <a:lstStyle/>
           <a:p>
             <a:r>
-              <a:rPr lang="en-US" dirty="0" err="1"/>
-              <a:t>Rviz</a:t>
-            </a:r>
-            <a:r>
               <a:rPr lang="en-US" dirty="0"/>
-              <a:t> Bang-bang Simulation of Bolt placement</a:t>
+              <a:t>Block diagram</a:t>
             </a:r>
           </a:p>
         </p:txBody>
       </p:sp>
+      <p:pic>
+        <p:nvPicPr>
+          <p:cNvPr id="3" name="Picture 2"/>
+          <p:cNvPicPr>
+            <a:picLocks noChangeAspect="1"/>
+          </p:cNvPicPr>
+          <p:nvPr/>
+        </p:nvPicPr>
+        <p:blipFill>
+          <a:blip r:embed="rId2"/>
+          <a:stretch>
+            <a:fillRect/>
+          </a:stretch>
+        </p:blipFill>
+        <p:spPr>
+          <a:xfrm>
+            <a:off x="218793" y="1936873"/>
+            <a:ext cx="11754414" cy="3975100"/>
+          </a:xfrm>
+          <a:prstGeom prst="rect">
+            <a:avLst/>
+          </a:prstGeom>
+        </p:spPr>
+      </p:pic>
     </p:spTree>
     <p:extLst>
       <p:ext uri="{BB962C8B-B14F-4D97-AF65-F5344CB8AC3E}">
-        <p14:creationId xmlns:p14="http://schemas.microsoft.com/office/powerpoint/2010/main" val="1610002266"/>
+        <p14:creationId xmlns:p14="http://schemas.microsoft.com/office/powerpoint/2010/main" val="3625719481"/>
       </p:ext>
     </p:extLst>
   </p:cSld>

</xml_diff>

<commit_message>
2 robot urdf with base offset bolt demo
</commit_message>
<xml_diff>
--- a/nistfanuc_ws/doc/ROSSlides.pptx
+++ b/nistfanuc_ws/doc/ROSSlides.pptx
@@ -251,7 +251,7 @@
           <a:p>
             <a:fld id="{D25E0E82-7B57-486F-86FB-260672CC33B7}" type="datetimeFigureOut">
               <a:rPr lang="en-US" smtClean="0"/>
-              <a:t>9/15/2016</a:t>
+              <a:t>9/22/2016</a:t>
             </a:fld>
             <a:endParaRPr lang="en-US"/>
           </a:p>
@@ -419,7 +419,7 @@
           <a:p>
             <a:fld id="{D25E0E82-7B57-486F-86FB-260672CC33B7}" type="datetimeFigureOut">
               <a:rPr lang="en-US" smtClean="0"/>
-              <a:t>9/15/2016</a:t>
+              <a:t>9/22/2016</a:t>
             </a:fld>
             <a:endParaRPr lang="en-US"/>
           </a:p>
@@ -597,7 +597,7 @@
           <a:p>
             <a:fld id="{D25E0E82-7B57-486F-86FB-260672CC33B7}" type="datetimeFigureOut">
               <a:rPr lang="en-US" smtClean="0"/>
-              <a:t>9/15/2016</a:t>
+              <a:t>9/22/2016</a:t>
             </a:fld>
             <a:endParaRPr lang="en-US"/>
           </a:p>
@@ -765,7 +765,7 @@
           <a:p>
             <a:fld id="{D25E0E82-7B57-486F-86FB-260672CC33B7}" type="datetimeFigureOut">
               <a:rPr lang="en-US" smtClean="0"/>
-              <a:t>9/15/2016</a:t>
+              <a:t>9/22/2016</a:t>
             </a:fld>
             <a:endParaRPr lang="en-US"/>
           </a:p>
@@ -1010,7 +1010,7 @@
           <a:p>
             <a:fld id="{D25E0E82-7B57-486F-86FB-260672CC33B7}" type="datetimeFigureOut">
               <a:rPr lang="en-US" smtClean="0"/>
-              <a:t>9/15/2016</a:t>
+              <a:t>9/22/2016</a:t>
             </a:fld>
             <a:endParaRPr lang="en-US"/>
           </a:p>
@@ -1239,7 +1239,7 @@
           <a:p>
             <a:fld id="{D25E0E82-7B57-486F-86FB-260672CC33B7}" type="datetimeFigureOut">
               <a:rPr lang="en-US" smtClean="0"/>
-              <a:t>9/15/2016</a:t>
+              <a:t>9/22/2016</a:t>
             </a:fld>
             <a:endParaRPr lang="en-US"/>
           </a:p>
@@ -1603,7 +1603,7 @@
           <a:p>
             <a:fld id="{D25E0E82-7B57-486F-86FB-260672CC33B7}" type="datetimeFigureOut">
               <a:rPr lang="en-US" smtClean="0"/>
-              <a:t>9/15/2016</a:t>
+              <a:t>9/22/2016</a:t>
             </a:fld>
             <a:endParaRPr lang="en-US"/>
           </a:p>
@@ -1720,7 +1720,7 @@
           <a:p>
             <a:fld id="{D25E0E82-7B57-486F-86FB-260672CC33B7}" type="datetimeFigureOut">
               <a:rPr lang="en-US" smtClean="0"/>
-              <a:t>9/15/2016</a:t>
+              <a:t>9/22/2016</a:t>
             </a:fld>
             <a:endParaRPr lang="en-US"/>
           </a:p>
@@ -1815,7 +1815,7 @@
           <a:p>
             <a:fld id="{D25E0E82-7B57-486F-86FB-260672CC33B7}" type="datetimeFigureOut">
               <a:rPr lang="en-US" smtClean="0"/>
-              <a:t>9/15/2016</a:t>
+              <a:t>9/22/2016</a:t>
             </a:fld>
             <a:endParaRPr lang="en-US"/>
           </a:p>
@@ -2090,7 +2090,7 @@
           <a:p>
             <a:fld id="{D25E0E82-7B57-486F-86FB-260672CC33B7}" type="datetimeFigureOut">
               <a:rPr lang="en-US" smtClean="0"/>
-              <a:t>9/15/2016</a:t>
+              <a:t>9/22/2016</a:t>
             </a:fld>
             <a:endParaRPr lang="en-US"/>
           </a:p>
@@ -2342,7 +2342,7 @@
           <a:p>
             <a:fld id="{D25E0E82-7B57-486F-86FB-260672CC33B7}" type="datetimeFigureOut">
               <a:rPr lang="en-US" smtClean="0"/>
-              <a:t>9/15/2016</a:t>
+              <a:t>9/22/2016</a:t>
             </a:fld>
             <a:endParaRPr lang="en-US"/>
           </a:p>
@@ -2553,7 +2553,7 @@
           <a:p>
             <a:fld id="{D25E0E82-7B57-486F-86FB-260672CC33B7}" type="datetimeFigureOut">
               <a:rPr lang="en-US" smtClean="0"/>
-              <a:t>9/15/2016</a:t>
+              <a:t>9/22/2016</a:t>
             </a:fld>
             <a:endParaRPr lang="en-US"/>
           </a:p>
@@ -2958,63 +2958,340 @@
           <a:chExt cx="0" cy="0"/>
         </a:xfrm>
       </p:grpSpPr>
-      <p:sp>
-        <p:nvSpPr>
-          <p:cNvPr id="2" name="Title 1"/>
-          <p:cNvSpPr>
-            <a:spLocks noGrp="1"/>
-          </p:cNvSpPr>
-          <p:nvPr>
-            <p:ph type="title"/>
-          </p:nvPr>
-        </p:nvSpPr>
-        <p:spPr/>
-        <p:txBody>
-          <a:bodyPr/>
-          <a:lstStyle/>
-          <a:p>
-            <a:endParaRPr lang="en-US"/>
-          </a:p>
-        </p:txBody>
-      </p:sp>
-      <p:sp>
-        <p:nvSpPr>
-          <p:cNvPr id="3" name="Content Placeholder 2"/>
-          <p:cNvSpPr>
-            <a:spLocks noGrp="1"/>
-          </p:cNvSpPr>
-          <p:nvPr>
-            <p:ph sz="half" idx="1"/>
-          </p:nvPr>
-        </p:nvSpPr>
-        <p:spPr/>
-        <p:txBody>
-          <a:bodyPr/>
-          <a:lstStyle/>
-          <a:p>
-            <a:endParaRPr lang="en-US"/>
-          </a:p>
-        </p:txBody>
-      </p:sp>
-      <p:sp>
-        <p:nvSpPr>
-          <p:cNvPr id="4" name="Content Placeholder 3"/>
-          <p:cNvSpPr>
-            <a:spLocks noGrp="1"/>
-          </p:cNvSpPr>
-          <p:nvPr>
-            <p:ph sz="half" idx="2"/>
-          </p:nvPr>
-        </p:nvSpPr>
-        <p:spPr/>
-        <p:txBody>
-          <a:bodyPr/>
-          <a:lstStyle/>
-          <a:p>
-            <a:endParaRPr lang="en-US"/>
-          </a:p>
-        </p:txBody>
-      </p:sp>
+      <p:pic>
+        <p:nvPicPr>
+          <p:cNvPr id="5" name="Picture 4"/>
+          <p:cNvPicPr>
+            <a:picLocks noChangeAspect="1"/>
+          </p:cNvPicPr>
+          <p:nvPr/>
+        </p:nvPicPr>
+        <p:blipFill rotWithShape="1">
+          <a:blip r:embed="rId2"/>
+          <a:srcRect t="28045" b="32991"/>
+          <a:stretch/>
+        </p:blipFill>
+        <p:spPr>
+          <a:xfrm>
+            <a:off x="4756638" y="365434"/>
+            <a:ext cx="1905000" cy="738554"/>
+          </a:xfrm>
+          <a:prstGeom prst="rect">
+            <a:avLst/>
+          </a:prstGeom>
+        </p:spPr>
+      </p:pic>
+      <p:pic>
+        <p:nvPicPr>
+          <p:cNvPr id="6" name="Picture 5"/>
+          <p:cNvPicPr>
+            <a:picLocks noChangeAspect="1"/>
+          </p:cNvPicPr>
+          <p:nvPr/>
+        </p:nvPicPr>
+        <p:blipFill>
+          <a:blip r:embed="rId3"/>
+          <a:stretch>
+            <a:fillRect/>
+          </a:stretch>
+        </p:blipFill>
+        <p:spPr>
+          <a:xfrm>
+            <a:off x="5174696" y="3347676"/>
+            <a:ext cx="5715000" cy="3048000"/>
+          </a:xfrm>
+          <a:prstGeom prst="rect">
+            <a:avLst/>
+          </a:prstGeom>
+        </p:spPr>
+      </p:pic>
+      <p:pic>
+        <p:nvPicPr>
+          <p:cNvPr id="8" name="Picture 7"/>
+          <p:cNvPicPr>
+            <a:picLocks noChangeAspect="1"/>
+          </p:cNvPicPr>
+          <p:nvPr/>
+        </p:nvPicPr>
+        <p:blipFill>
+          <a:blip r:embed="rId4"/>
+          <a:stretch>
+            <a:fillRect/>
+          </a:stretch>
+        </p:blipFill>
+        <p:spPr>
+          <a:xfrm>
+            <a:off x="568357" y="5459290"/>
+            <a:ext cx="801565" cy="801565"/>
+          </a:xfrm>
+          <a:prstGeom prst="rect">
+            <a:avLst/>
+          </a:prstGeom>
+        </p:spPr>
+      </p:pic>
+      <p:pic>
+        <p:nvPicPr>
+          <p:cNvPr id="9" name="Picture 8"/>
+          <p:cNvPicPr>
+            <a:picLocks noChangeAspect="1"/>
+          </p:cNvPicPr>
+          <p:nvPr/>
+        </p:nvPicPr>
+        <p:blipFill>
+          <a:blip r:embed="rId5"/>
+          <a:stretch>
+            <a:fillRect/>
+          </a:stretch>
+        </p:blipFill>
+        <p:spPr>
+          <a:xfrm>
+            <a:off x="81821" y="5477630"/>
+            <a:ext cx="1982939" cy="808891"/>
+          </a:xfrm>
+          <a:prstGeom prst="rect">
+            <a:avLst/>
+          </a:prstGeom>
+        </p:spPr>
+      </p:pic>
+      <p:pic>
+        <p:nvPicPr>
+          <p:cNvPr id="10" name="Picture 9"/>
+          <p:cNvPicPr>
+            <a:picLocks noChangeAspect="1"/>
+          </p:cNvPicPr>
+          <p:nvPr/>
+        </p:nvPicPr>
+        <p:blipFill>
+          <a:blip r:embed="rId6"/>
+          <a:stretch>
+            <a:fillRect/>
+          </a:stretch>
+        </p:blipFill>
+        <p:spPr>
+          <a:xfrm>
+            <a:off x="2399323" y="3670249"/>
+            <a:ext cx="1566913" cy="1528762"/>
+          </a:xfrm>
+          <a:prstGeom prst="rect">
+            <a:avLst/>
+          </a:prstGeom>
+        </p:spPr>
+      </p:pic>
+      <p:pic>
+        <p:nvPicPr>
+          <p:cNvPr id="11" name="Picture 10"/>
+          <p:cNvPicPr>
+            <a:picLocks noChangeAspect="1"/>
+          </p:cNvPicPr>
+          <p:nvPr/>
+        </p:nvPicPr>
+        <p:blipFill>
+          <a:blip r:embed="rId7"/>
+          <a:stretch>
+            <a:fillRect/>
+          </a:stretch>
+        </p:blipFill>
+        <p:spPr>
+          <a:xfrm>
+            <a:off x="3781815" y="4154196"/>
+            <a:ext cx="1317507" cy="833070"/>
+          </a:xfrm>
+          <a:prstGeom prst="rect">
+            <a:avLst/>
+          </a:prstGeom>
+        </p:spPr>
+      </p:pic>
+      <p:pic>
+        <p:nvPicPr>
+          <p:cNvPr id="14" name="Picture 13"/>
+          <p:cNvPicPr>
+            <a:picLocks noChangeAspect="1"/>
+          </p:cNvPicPr>
+          <p:nvPr/>
+        </p:nvPicPr>
+        <p:blipFill>
+          <a:blip r:embed="rId8"/>
+          <a:stretch>
+            <a:fillRect/>
+          </a:stretch>
+        </p:blipFill>
+        <p:spPr>
+          <a:xfrm>
+            <a:off x="158262" y="1835399"/>
+            <a:ext cx="2383756" cy="1621814"/>
+          </a:xfrm>
+          <a:prstGeom prst="rect">
+            <a:avLst/>
+          </a:prstGeom>
+        </p:spPr>
+      </p:pic>
+      <p:pic>
+        <p:nvPicPr>
+          <p:cNvPr id="16" name="Picture 15"/>
+          <p:cNvPicPr>
+            <a:picLocks noChangeAspect="1"/>
+          </p:cNvPicPr>
+          <p:nvPr/>
+        </p:nvPicPr>
+        <p:blipFill>
+          <a:blip r:embed="rId9"/>
+          <a:stretch>
+            <a:fillRect/>
+          </a:stretch>
+        </p:blipFill>
+        <p:spPr>
+          <a:xfrm>
+            <a:off x="0" y="3457213"/>
+            <a:ext cx="2399323" cy="1799492"/>
+          </a:xfrm>
+          <a:prstGeom prst="rect">
+            <a:avLst/>
+          </a:prstGeom>
+        </p:spPr>
+      </p:pic>
+      <p:pic>
+        <p:nvPicPr>
+          <p:cNvPr id="18" name="Picture 17"/>
+          <p:cNvPicPr>
+            <a:picLocks noChangeAspect="1"/>
+          </p:cNvPicPr>
+          <p:nvPr/>
+        </p:nvPicPr>
+        <p:blipFill>
+          <a:blip r:embed="rId10"/>
+          <a:stretch>
+            <a:fillRect/>
+          </a:stretch>
+        </p:blipFill>
+        <p:spPr>
+          <a:xfrm>
+            <a:off x="5791200" y="3124200"/>
+            <a:ext cx="609600" cy="609600"/>
+          </a:xfrm>
+          <a:prstGeom prst="rect">
+            <a:avLst/>
+          </a:prstGeom>
+        </p:spPr>
+      </p:pic>
+      <p:pic>
+        <p:nvPicPr>
+          <p:cNvPr id="19" name="Picture 18"/>
+          <p:cNvPicPr>
+            <a:picLocks noChangeAspect="1"/>
+          </p:cNvPicPr>
+          <p:nvPr/>
+        </p:nvPicPr>
+        <p:blipFill>
+          <a:blip r:embed="rId11"/>
+          <a:stretch>
+            <a:fillRect/>
+          </a:stretch>
+        </p:blipFill>
+        <p:spPr>
+          <a:xfrm>
+            <a:off x="2273426" y="5204491"/>
+            <a:ext cx="985939" cy="1056364"/>
+          </a:xfrm>
+          <a:prstGeom prst="rect">
+            <a:avLst/>
+          </a:prstGeom>
+        </p:spPr>
+      </p:pic>
+      <p:pic>
+        <p:nvPicPr>
+          <p:cNvPr id="20" name="Picture 19"/>
+          <p:cNvPicPr>
+            <a:picLocks noChangeAspect="1"/>
+          </p:cNvPicPr>
+          <p:nvPr/>
+        </p:nvPicPr>
+        <p:blipFill>
+          <a:blip r:embed="rId12"/>
+          <a:stretch>
+            <a:fillRect/>
+          </a:stretch>
+        </p:blipFill>
+        <p:spPr>
+          <a:xfrm>
+            <a:off x="4762500" y="2914650"/>
+            <a:ext cx="2667000" cy="1028700"/>
+          </a:xfrm>
+          <a:prstGeom prst="rect">
+            <a:avLst/>
+          </a:prstGeom>
+        </p:spPr>
+      </p:pic>
+      <p:pic>
+        <p:nvPicPr>
+          <p:cNvPr id="21" name="Picture 20"/>
+          <p:cNvPicPr>
+            <a:picLocks noChangeAspect="1"/>
+          </p:cNvPicPr>
+          <p:nvPr/>
+        </p:nvPicPr>
+        <p:blipFill>
+          <a:blip r:embed="rId12"/>
+          <a:stretch>
+            <a:fillRect/>
+          </a:stretch>
+        </p:blipFill>
+        <p:spPr>
+          <a:xfrm>
+            <a:off x="4914900" y="3067050"/>
+            <a:ext cx="2667000" cy="1028700"/>
+          </a:xfrm>
+          <a:prstGeom prst="rect">
+            <a:avLst/>
+          </a:prstGeom>
+        </p:spPr>
+      </p:pic>
+      <p:pic>
+        <p:nvPicPr>
+          <p:cNvPr id="22" name="Picture 21"/>
+          <p:cNvPicPr>
+            <a:picLocks noChangeAspect="1"/>
+          </p:cNvPicPr>
+          <p:nvPr/>
+        </p:nvPicPr>
+        <p:blipFill rotWithShape="1">
+          <a:blip r:embed="rId13"/>
+          <a:srcRect l="17731" r="16796"/>
+          <a:stretch/>
+        </p:blipFill>
+        <p:spPr>
+          <a:xfrm>
+            <a:off x="3452447" y="5295741"/>
+            <a:ext cx="1462453" cy="1172670"/>
+          </a:xfrm>
+          <a:prstGeom prst="rect">
+            <a:avLst/>
+          </a:prstGeom>
+        </p:spPr>
+      </p:pic>
+      <p:pic>
+        <p:nvPicPr>
+          <p:cNvPr id="23" name="Picture 22"/>
+          <p:cNvPicPr>
+            <a:picLocks noChangeAspect="1"/>
+          </p:cNvPicPr>
+          <p:nvPr/>
+        </p:nvPicPr>
+        <p:blipFill>
+          <a:blip r:embed="rId14"/>
+          <a:stretch>
+            <a:fillRect/>
+          </a:stretch>
+        </p:blipFill>
+        <p:spPr>
+          <a:xfrm>
+            <a:off x="2925949" y="2666272"/>
+            <a:ext cx="674077" cy="674077"/>
+          </a:xfrm>
+          <a:prstGeom prst="rect">
+            <a:avLst/>
+          </a:prstGeom>
+        </p:spPr>
+      </p:pic>
     </p:spTree>
     <p:extLst>
       <p:ext uri="{BB962C8B-B14F-4D97-AF65-F5344CB8AC3E}">
@@ -3060,15 +3337,11 @@
           <a:bodyPr/>
           <a:lstStyle/>
           <a:p>
+            <a:pPr algn="ctr"/>
             <a:r>
               <a:rPr lang="en-US" dirty="0"/>
-              <a:t>Pose Data </a:t>
-            </a:r>
-            <a:r>
-              <a:rPr lang="en-US"/>
-              <a:t>Type Spaghetti</a:t>
-            </a:r>
-            <a:endParaRPr lang="en-US" dirty="0"/>
+              <a:t>Pose Data Type Spaghetti</a:t>
+            </a:r>
           </a:p>
         </p:txBody>
       </p:sp>

</xml_diff>